<commit_message>
catching up to latest changes
</commit_message>
<xml_diff>
--- a/downloads/mvr3d-call-for-papers.pptx
+++ b/downloads/mvr3d-call-for-papers.pptx
@@ -208,7 +208,7 @@
           <a:p>
             <a:fld id="{FF9E4751-C4D6-40B0-848A-F05F99D7F7E6}" type="datetimeFigureOut">
               <a:rPr lang="en-US" smtClean="0"/>
-              <a:t>5/7/2017</a:t>
+              <a:t>5/10/2017</a:t>
             </a:fld>
             <a:endParaRPr lang="en-US"/>
           </a:p>
@@ -742,7 +742,7 @@
             <a:fld id="{02F82DA1-06B6-5046-840D-1927F118E7DA}" type="datetimeFigureOut">
               <a:rPr lang="en-US" smtClean="0"/>
               <a:pPr/>
-              <a:t>5/7/2017</a:t>
+              <a:t>5/10/2017</a:t>
             </a:fld>
             <a:endParaRPr lang="en-US"/>
           </a:p>
@@ -914,7 +914,7 @@
             <a:fld id="{02F82DA1-06B6-5046-840D-1927F118E7DA}" type="datetimeFigureOut">
               <a:rPr lang="en-US" smtClean="0"/>
               <a:pPr/>
-              <a:t>5/7/2017</a:t>
+              <a:t>5/10/2017</a:t>
             </a:fld>
             <a:endParaRPr lang="en-US"/>
           </a:p>
@@ -1096,7 +1096,7 @@
             <a:fld id="{02F82DA1-06B6-5046-840D-1927F118E7DA}" type="datetimeFigureOut">
               <a:rPr lang="en-US" smtClean="0"/>
               <a:pPr/>
-              <a:t>5/7/2017</a:t>
+              <a:t>5/10/2017</a:t>
             </a:fld>
             <a:endParaRPr lang="en-US"/>
           </a:p>
@@ -1268,7 +1268,7 @@
             <a:fld id="{02F82DA1-06B6-5046-840D-1927F118E7DA}" type="datetimeFigureOut">
               <a:rPr lang="en-US" smtClean="0"/>
               <a:pPr/>
-              <a:t>5/7/2017</a:t>
+              <a:t>5/10/2017</a:t>
             </a:fld>
             <a:endParaRPr lang="en-US"/>
           </a:p>
@@ -1516,7 +1516,7 @@
             <a:fld id="{02F82DA1-06B6-5046-840D-1927F118E7DA}" type="datetimeFigureOut">
               <a:rPr lang="en-US" smtClean="0"/>
               <a:pPr/>
-              <a:t>5/7/2017</a:t>
+              <a:t>5/10/2017</a:t>
             </a:fld>
             <a:endParaRPr lang="en-US"/>
           </a:p>
@@ -1806,7 +1806,7 @@
             <a:fld id="{02F82DA1-06B6-5046-840D-1927F118E7DA}" type="datetimeFigureOut">
               <a:rPr lang="en-US" smtClean="0"/>
               <a:pPr/>
-              <a:t>5/7/2017</a:t>
+              <a:t>5/10/2017</a:t>
             </a:fld>
             <a:endParaRPr lang="en-US"/>
           </a:p>
@@ -2235,7 +2235,7 @@
             <a:fld id="{02F82DA1-06B6-5046-840D-1927F118E7DA}" type="datetimeFigureOut">
               <a:rPr lang="en-US" smtClean="0"/>
               <a:pPr/>
-              <a:t>5/7/2017</a:t>
+              <a:t>5/10/2017</a:t>
             </a:fld>
             <a:endParaRPr lang="en-US"/>
           </a:p>
@@ -2355,7 +2355,7 @@
             <a:fld id="{02F82DA1-06B6-5046-840D-1927F118E7DA}" type="datetimeFigureOut">
               <a:rPr lang="en-US" smtClean="0"/>
               <a:pPr/>
-              <a:t>5/7/2017</a:t>
+              <a:t>5/10/2017</a:t>
             </a:fld>
             <a:endParaRPr lang="en-US"/>
           </a:p>
@@ -2452,7 +2452,7 @@
             <a:fld id="{02F82DA1-06B6-5046-840D-1927F118E7DA}" type="datetimeFigureOut">
               <a:rPr lang="en-US" smtClean="0"/>
               <a:pPr/>
-              <a:t>5/7/2017</a:t>
+              <a:t>5/10/2017</a:t>
             </a:fld>
             <a:endParaRPr lang="en-US"/>
           </a:p>
@@ -2731,7 +2731,7 @@
             <a:fld id="{02F82DA1-06B6-5046-840D-1927F118E7DA}" type="datetimeFigureOut">
               <a:rPr lang="en-US" smtClean="0"/>
               <a:pPr/>
-              <a:t>5/7/2017</a:t>
+              <a:t>5/10/2017</a:t>
             </a:fld>
             <a:endParaRPr lang="en-US"/>
           </a:p>
@@ -2986,7 +2986,7 @@
             <a:fld id="{02F82DA1-06B6-5046-840D-1927F118E7DA}" type="datetimeFigureOut">
               <a:rPr lang="en-US" smtClean="0"/>
               <a:pPr/>
-              <a:t>5/7/2017</a:t>
+              <a:t>5/10/2017</a:t>
             </a:fld>
             <a:endParaRPr lang="en-US"/>
           </a:p>
@@ -3201,7 +3201,7 @@
             <a:fld id="{02F82DA1-06B6-5046-840D-1927F118E7DA}" type="datetimeFigureOut">
               <a:rPr lang="en-US" smtClean="0"/>
               <a:pPr/>
-              <a:t>5/7/2017</a:t>
+              <a:t>5/10/2017</a:t>
             </a:fld>
             <a:endParaRPr lang="en-US"/>
           </a:p>
@@ -3641,18 +3641,7 @@
                 <a:ea typeface="Verdana" panose="020B0604030504040204" pitchFamily="34" charset="0"/>
                 <a:cs typeface="Verdana" panose="020B0604030504040204" pitchFamily="34" charset="0"/>
               </a:rPr>
-              <a:t>OCTOBER, 29, </a:t>
-            </a:r>
-            <a:r>
-              <a:rPr lang="en-US" dirty="0" smtClean="0">
-                <a:solidFill>
-                  <a:schemeClr val="bg1"/>
-                </a:solidFill>
-                <a:latin typeface="Open Sans"/>
-                <a:ea typeface="Verdana" panose="020B0604030504040204" pitchFamily="34" charset="0"/>
-                <a:cs typeface="Verdana" panose="020B0604030504040204" pitchFamily="34" charset="0"/>
-              </a:rPr>
-              <a:t>2017  </a:t>
+              <a:t>OCTOBER, 29, 2017  </a:t>
             </a:r>
             <a:r>
               <a:rPr lang="en-US" dirty="0">
@@ -3818,7 +3807,7 @@
         </p:nvSpPr>
         <p:spPr>
           <a:xfrm>
-            <a:off x="107032" y="1228272"/>
+            <a:off x="107032" y="1215572"/>
             <a:ext cx="2419252" cy="400110"/>
           </a:xfrm>
           <a:prstGeom prst="rect">
@@ -3858,7 +3847,7 @@
         </p:nvSpPr>
         <p:spPr>
           <a:xfrm>
-            <a:off x="107032" y="1629906"/>
+            <a:off x="107032" y="1579106"/>
             <a:ext cx="655949" cy="307777"/>
           </a:xfrm>
           <a:prstGeom prst="rect">
@@ -3898,7 +3887,7 @@
         </p:nvSpPr>
         <p:spPr>
           <a:xfrm>
-            <a:off x="107032" y="4305660"/>
+            <a:off x="107032" y="4254860"/>
             <a:ext cx="699230" cy="307777"/>
           </a:xfrm>
           <a:prstGeom prst="rect">
@@ -3933,13 +3922,15 @@
       <p:cxnSp>
         <p:nvCxnSpPr>
           <p:cNvPr id="5" name="Straight Connector 4"/>
-          <p:cNvCxnSpPr/>
+          <p:cNvCxnSpPr>
+            <a:endCxn id="32" idx="3"/>
+          </p:cNvCxnSpPr>
           <p:nvPr/>
         </p:nvCxnSpPr>
         <p:spPr>
           <a:xfrm>
-            <a:off x="3483429" y="1543050"/>
-            <a:ext cx="0" cy="7019326"/>
+            <a:off x="3430347" y="1294427"/>
+            <a:ext cx="53082" cy="7225534"/>
           </a:xfrm>
           <a:prstGeom prst="line">
             <a:avLst/>
@@ -3973,7 +3964,7 @@
         </p:nvSpPr>
         <p:spPr>
           <a:xfrm>
-            <a:off x="107032" y="1937112"/>
+            <a:off x="107032" y="1886312"/>
             <a:ext cx="3287150" cy="2400657"/>
           </a:xfrm>
           <a:prstGeom prst="rect">
@@ -4065,7 +4056,7 @@
         </p:nvSpPr>
         <p:spPr>
           <a:xfrm>
-            <a:off x="107032" y="4608400"/>
+            <a:off x="107032" y="4557600"/>
             <a:ext cx="3343739" cy="3323987"/>
           </a:xfrm>
           <a:prstGeom prst="rect">
@@ -4080,13 +4071,22 @@
           <a:p>
             <a:pPr algn="just"/>
             <a:r>
+              <a:rPr lang="en-US" sz="1000" dirty="0" smtClean="0">
+                <a:solidFill>
+                  <a:srgbClr val="777777"/>
+                </a:solidFill>
+                <a:latin typeface="Open Sans"/>
+              </a:rPr>
+              <a:t>The </a:t>
+            </a:r>
+            <a:r>
               <a:rPr lang="en-US" sz="1000" dirty="0">
                 <a:solidFill>
                   <a:srgbClr val="777777"/>
                 </a:solidFill>
                 <a:latin typeface="Open Sans"/>
               </a:rPr>
-              <a:t>The goal of this workshop is to push the frontier in the area of global multi-scan alignment. Focal points for discussions and solicited submissions include but are not limited to</a:t>
+              <a:t>goal of this workshop is to push the frontier in the area of global multi-scan alignment. Focal points for discussions and solicited submissions include but are not limited to</a:t>
             </a:r>
             <a:r>
               <a:rPr lang="en-US" sz="1000" dirty="0" smtClean="0">
@@ -4792,8 +4792,8 @@
         </p:nvSpPr>
         <p:spPr>
           <a:xfrm>
-            <a:off x="2542755" y="8670768"/>
-            <a:ext cx="1915910" cy="369332"/>
+            <a:off x="2566425" y="8734268"/>
+            <a:ext cx="1725151" cy="338554"/>
           </a:xfrm>
           <a:prstGeom prst="rect">
             <a:avLst/>
@@ -4808,7 +4808,7 @@
           <a:p>
             <a:pPr algn="ctr"/>
             <a:r>
-              <a:rPr lang="en-US" b="1" dirty="0" smtClean="0">
+              <a:rPr lang="en-US" sz="1600" b="1" dirty="0" smtClean="0">
                 <a:solidFill>
                   <a:schemeClr val="tx1">
                     <a:lumMod val="85000"/>
@@ -4820,7 +4820,7 @@
               </a:rPr>
               <a:t>mvr3d.github.io</a:t>
             </a:r>
-            <a:endParaRPr lang="en-US" b="1" dirty="0">
+            <a:endParaRPr lang="en-US" sz="1600" b="1" dirty="0">
               <a:solidFill>
                 <a:schemeClr val="tx1">
                   <a:lumMod val="85000"/>
@@ -4840,7 +4840,7 @@
         </p:nvSpPr>
         <p:spPr>
           <a:xfrm>
-            <a:off x="117798" y="7893149"/>
+            <a:off x="117798" y="7842349"/>
             <a:ext cx="769763" cy="307777"/>
           </a:xfrm>
           <a:prstGeom prst="rect">
@@ -4941,7 +4941,25 @@
                 </a:solidFill>
                 <a:latin typeface="Open Sans"/>
               </a:rPr>
-              <a:t>Andrew Fitzgibbon, Michael Bronstein, </a:t>
+              <a:t>Andrew Fitzgibbon, </a:t>
+            </a:r>
+            <a:r>
+              <a:rPr lang="en-US" sz="1000" b="1" dirty="0" smtClean="0">
+                <a:solidFill>
+                  <a:srgbClr val="777777"/>
+                </a:solidFill>
+                <a:latin typeface="Open Sans"/>
+              </a:rPr>
+              <a:t>Alex Bronstein</a:t>
+            </a:r>
+            <a:r>
+              <a:rPr lang="en-US" sz="1000" b="1" dirty="0" smtClean="0">
+                <a:solidFill>
+                  <a:srgbClr val="777777"/>
+                </a:solidFill>
+                <a:latin typeface="Open Sans"/>
+              </a:rPr>
+              <a:t>, </a:t>
             </a:r>
             <a:r>
               <a:rPr lang="en-US" sz="1000" b="1" dirty="0" err="1" smtClean="0">
@@ -5059,22 +5077,22 @@
               <a:t>Schindler, </a:t>
             </a:r>
             <a:r>
-              <a:rPr lang="en-US" sz="1000" b="1" dirty="0" err="1" smtClean="0">
-                <a:solidFill>
-                  <a:srgbClr val="777777"/>
-                </a:solidFill>
-                <a:latin typeface="Open Sans"/>
-              </a:rPr>
-              <a:t>Chrisopher</a:t>
-            </a:r>
-            <a:r>
               <a:rPr lang="en-US" sz="1000" b="1" dirty="0" smtClean="0">
                 <a:solidFill>
                   <a:srgbClr val="777777"/>
                 </a:solidFill>
                 <a:latin typeface="Open Sans"/>
               </a:rPr>
-              <a:t> Zach and Luc Robert</a:t>
+              <a:t>Christopher </a:t>
+            </a:r>
+            <a:r>
+              <a:rPr lang="en-US" sz="1000" b="1" dirty="0" smtClean="0">
+                <a:solidFill>
+                  <a:srgbClr val="777777"/>
+                </a:solidFill>
+                <a:latin typeface="Open Sans"/>
+              </a:rPr>
+              <a:t>Zach and Luc Robert</a:t>
             </a:r>
           </a:p>
         </p:txBody>
@@ -5578,22 +5596,31 @@
               <a:t>, </a:t>
             </a:r>
             <a:r>
+              <a:rPr lang="en-US" sz="1000" dirty="0" smtClean="0">
+                <a:solidFill>
+                  <a:srgbClr val="777777"/>
+                </a:solidFill>
+                <a:latin typeface="Open Sans"/>
+              </a:rPr>
+              <a:t>Emanuele </a:t>
+            </a:r>
+            <a:r>
               <a:rPr lang="en-US" sz="1000" dirty="0" err="1" smtClean="0">
                 <a:solidFill>
                   <a:srgbClr val="777777"/>
                 </a:solidFill>
                 <a:latin typeface="Open Sans"/>
               </a:rPr>
-              <a:t>Emanuela</a:t>
-            </a:r>
-            <a:r>
-              <a:rPr lang="en-US" sz="1000" dirty="0" smtClean="0">
-                <a:solidFill>
-                  <a:srgbClr val="777777"/>
-                </a:solidFill>
-                <a:latin typeface="Open Sans"/>
-              </a:rPr>
-              <a:t> </a:t>
+              <a:t>Rodola</a:t>
+            </a:r>
+            <a:r>
+              <a:rPr lang="en-US" sz="1000" dirty="0" smtClean="0">
+                <a:solidFill>
+                  <a:srgbClr val="777777"/>
+                </a:solidFill>
+                <a:latin typeface="Open Sans"/>
+              </a:rPr>
+              <a:t>, Gul </a:t>
             </a:r>
             <a:r>
               <a:rPr lang="en-US" sz="1000" dirty="0" err="1" smtClean="0">
@@ -5602,16 +5629,16 @@
                 </a:solidFill>
                 <a:latin typeface="Open Sans"/>
               </a:rPr>
-              <a:t>Rodola</a:t>
-            </a:r>
-            <a:r>
-              <a:rPr lang="en-US" sz="1000" dirty="0" smtClean="0">
-                <a:solidFill>
-                  <a:srgbClr val="777777"/>
-                </a:solidFill>
-                <a:latin typeface="Open Sans"/>
-              </a:rPr>
-              <a:t>, Gul </a:t>
+              <a:t>Varol</a:t>
+            </a:r>
+            <a:r>
+              <a:rPr lang="en-US" sz="1000" dirty="0" smtClean="0">
+                <a:solidFill>
+                  <a:srgbClr val="777777"/>
+                </a:solidFill>
+                <a:latin typeface="Open Sans"/>
+              </a:rPr>
+              <a:t>, Slobodan Ilic, Andrea </a:t>
             </a:r>
             <a:r>
               <a:rPr lang="en-US" sz="1000" dirty="0" err="1" smtClean="0">
@@ -5620,24 +5647,6 @@
                 </a:solidFill>
                 <a:latin typeface="Open Sans"/>
               </a:rPr>
-              <a:t>Varol</a:t>
-            </a:r>
-            <a:r>
-              <a:rPr lang="en-US" sz="1000" dirty="0" smtClean="0">
-                <a:solidFill>
-                  <a:srgbClr val="777777"/>
-                </a:solidFill>
-                <a:latin typeface="Open Sans"/>
-              </a:rPr>
-              <a:t>, Slobodan Ilic, Andrea </a:t>
-            </a:r>
-            <a:r>
-              <a:rPr lang="en-US" sz="1000" dirty="0" err="1" smtClean="0">
-                <a:solidFill>
-                  <a:srgbClr val="777777"/>
-                </a:solidFill>
-                <a:latin typeface="Open Sans"/>
-              </a:rPr>
               <a:t>Torsello</a:t>
             </a:r>
             <a:r>
@@ -5650,13 +5659,13 @@
               <a:t>, Umberto </a:t>
             </a:r>
             <a:r>
-              <a:rPr lang="en-US" sz="1000" dirty="0" err="1" smtClean="0">
-                <a:solidFill>
-                  <a:srgbClr val="777777"/>
-                </a:solidFill>
-                <a:latin typeface="Open Sans"/>
-              </a:rPr>
-              <a:t>Castellini</a:t>
+              <a:rPr lang="en-US" sz="1000" dirty="0" smtClean="0">
+                <a:solidFill>
+                  <a:srgbClr val="777777"/>
+                </a:solidFill>
+                <a:latin typeface="Open Sans"/>
+              </a:rPr>
+              <a:t>Castellani</a:t>
             </a:r>
             <a:endParaRPr lang="en-US" sz="1000" dirty="0" smtClean="0">
               <a:solidFill>
@@ -5885,8 +5894,8 @@
         </p:nvSpPr>
         <p:spPr>
           <a:xfrm>
-            <a:off x="105968" y="8139874"/>
-            <a:ext cx="3377461" cy="553998"/>
+            <a:off x="105968" y="8089074"/>
+            <a:ext cx="3377461" cy="861774"/>
           </a:xfrm>
           <a:prstGeom prst="rect">
             <a:avLst/>
@@ -5941,7 +5950,70 @@
                 </a:solidFill>
                 <a:latin typeface="Open Sans"/>
               </a:rPr>
-              <a:t> will include a RealSense camera, </a:t>
+              <a:t> will include </a:t>
+            </a:r>
+            <a:r>
+              <a:rPr lang="en-US" sz="1000" dirty="0" smtClean="0">
+                <a:solidFill>
+                  <a:srgbClr val="777777"/>
+                </a:solidFill>
+                <a:latin typeface="Open Sans"/>
+              </a:rPr>
+              <a:t>an Intel </a:t>
+            </a:r>
+            <a:r>
+              <a:rPr lang="en-US" sz="1000" dirty="0" smtClean="0">
+                <a:solidFill>
+                  <a:srgbClr val="777777"/>
+                </a:solidFill>
+                <a:latin typeface="Open Sans"/>
+              </a:rPr>
+              <a:t>RealSense </a:t>
+            </a:r>
+            <a:r>
+              <a:rPr lang="en-US" sz="1000" dirty="0" smtClean="0">
+                <a:solidFill>
+                  <a:srgbClr val="777777"/>
+                </a:solidFill>
+                <a:latin typeface="Open Sans"/>
+              </a:rPr>
+              <a:t>camera </a:t>
+            </a:r>
+            <a:r>
+              <a:rPr lang="en-US" sz="1000" dirty="0" smtClean="0">
+                <a:solidFill>
+                  <a:srgbClr val="777777"/>
+                </a:solidFill>
+                <a:latin typeface="Open Sans"/>
+              </a:rPr>
+              <a:t>and </a:t>
+            </a:r>
+            <a:r>
+              <a:rPr lang="en-US" sz="1000" dirty="0" smtClean="0">
+                <a:solidFill>
+                  <a:srgbClr val="777777"/>
+                </a:solidFill>
+                <a:latin typeface="Open Sans"/>
+              </a:rPr>
+              <a:t>3D Flow Zephyr Pro software. </a:t>
+            </a:r>
+            <a:r>
+              <a:rPr lang="en-US" sz="1000" b="1" dirty="0" smtClean="0">
+                <a:solidFill>
+                  <a:srgbClr val="777777"/>
+                </a:solidFill>
+                <a:latin typeface="Open Sans"/>
+              </a:rPr>
+              <a:t>Authors of all accepted papers </a:t>
+            </a:r>
+            <a:r>
+              <a:rPr lang="en-US" sz="1000" dirty="0" smtClean="0">
+                <a:solidFill>
+                  <a:srgbClr val="777777"/>
+                </a:solidFill>
+                <a:latin typeface="Open Sans"/>
+              </a:rPr>
+              <a:t>will receive </a:t>
             </a:r>
             <a:r>
               <a:rPr lang="en-US" sz="1000" dirty="0">
@@ -5950,16 +6022,33 @@
                 </a:solidFill>
                 <a:latin typeface="Open Sans"/>
               </a:rPr>
-              <a:t>sponsored by Intel</a:t>
-            </a:r>
-            <a:r>
-              <a:rPr lang="en-US" sz="1000" dirty="0" smtClean="0">
-                <a:solidFill>
-                  <a:srgbClr val="777777"/>
-                </a:solidFill>
-                <a:latin typeface="Open Sans"/>
-              </a:rPr>
-              <a:t>. </a:t>
+              <a:t>3D Flow </a:t>
+            </a:r>
+            <a:r>
+              <a:rPr lang="en-US" sz="1000" dirty="0" smtClean="0">
+                <a:solidFill>
+                  <a:srgbClr val="777777"/>
+                </a:solidFill>
+                <a:latin typeface="Open Sans"/>
+              </a:rPr>
+              <a:t/>
+            </a:r>
+            <a:br>
+              <a:rPr lang="en-US" sz="1000" dirty="0" smtClean="0">
+                <a:solidFill>
+                  <a:srgbClr val="777777"/>
+                </a:solidFill>
+                <a:latin typeface="Open Sans"/>
+              </a:rPr>
+            </a:br>
+            <a:r>
+              <a:rPr lang="en-US" sz="1000" dirty="0" smtClean="0">
+                <a:solidFill>
+                  <a:srgbClr val="777777"/>
+                </a:solidFill>
+                <a:latin typeface="Open Sans"/>
+              </a:rPr>
+              <a:t>Zephyr Light software license.</a:t>
             </a:r>
             <a:endParaRPr lang="en-US" sz="1000" dirty="0"/>
           </a:p>
@@ -6567,12 +6656,9 @@
 </file>
 
 <file path=customXml/item1.xml><?xml version="1.0" encoding="utf-8"?>
-<?mso-contentType ?>
-<FormTemplates xmlns="http://schemas.microsoft.com/sharepoint/v3/contenttype/forms">
-  <Display>DocumentLibraryForm</Display>
-  <Edit>DocumentLibraryForm</Edit>
-  <New>DocumentLibraryForm</New>
-</FormTemplates>
+<p:properties xmlns:p="http://schemas.microsoft.com/office/2006/metadata/properties" xmlns:xsi="http://www.w3.org/2001/XMLSchema-instance" xmlns:pc="http://schemas.microsoft.com/office/infopath/2007/PartnerControls">
+  <documentManagement/>
+</p:properties>
 </file>
 
 <file path=customXml/item2.xml><?xml version="1.0" encoding="utf-8"?>
@@ -6690,15 +6776,25 @@
 </file>
 
 <file path=customXml/item3.xml><?xml version="1.0" encoding="utf-8"?>
-<p:properties xmlns:p="http://schemas.microsoft.com/office/2006/metadata/properties" xmlns:xsi="http://www.w3.org/2001/XMLSchema-instance" xmlns:pc="http://schemas.microsoft.com/office/infopath/2007/PartnerControls">
-  <documentManagement/>
-</p:properties>
+<?mso-contentType ?>
+<FormTemplates xmlns="http://schemas.microsoft.com/sharepoint/v3/contenttype/forms">
+  <Display>DocumentLibraryForm</Display>
+  <Edit>DocumentLibraryForm</Edit>
+  <New>DocumentLibraryForm</New>
+</FormTemplates>
 </file>
 
 <file path=customXml/itemProps1.xml><?xml version="1.0" encoding="utf-8"?>
-<ds:datastoreItem xmlns:ds="http://schemas.openxmlformats.org/officeDocument/2006/customXml" ds:itemID="{0DBC4591-D6F0-4797-B1CB-1F0635331027}">
+<ds:datastoreItem xmlns:ds="http://schemas.openxmlformats.org/officeDocument/2006/customXml" ds:itemID="{1BA25D61-2AFC-48D1-BFBB-8FB6ED2230C1}">
   <ds:schemaRefs>
-    <ds:schemaRef ds:uri="http://schemas.microsoft.com/sharepoint/v3/contenttype/forms"/>
+    <ds:schemaRef ds:uri="http://schemas.microsoft.com/office/2006/documentManagement/types"/>
+    <ds:schemaRef ds:uri="http://schemas.microsoft.com/office/2006/metadata/properties"/>
+    <ds:schemaRef ds:uri="http://purl.org/dc/dcmitype/"/>
+    <ds:schemaRef ds:uri="http://purl.org/dc/elements/1.1/"/>
+    <ds:schemaRef ds:uri="http://purl.org/dc/terms/"/>
+    <ds:schemaRef ds:uri="http://www.w3.org/XML/1998/namespace"/>
+    <ds:schemaRef ds:uri="http://schemas.microsoft.com/office/infopath/2007/PartnerControls"/>
+    <ds:schemaRef ds:uri="http://schemas.openxmlformats.org/package/2006/metadata/core-properties"/>
   </ds:schemaRefs>
 </ds:datastoreItem>
 </file>
@@ -6720,16 +6816,9 @@
 </file>
 
 <file path=customXml/itemProps3.xml><?xml version="1.0" encoding="utf-8"?>
-<ds:datastoreItem xmlns:ds="http://schemas.openxmlformats.org/officeDocument/2006/customXml" ds:itemID="{1BA25D61-2AFC-48D1-BFBB-8FB6ED2230C1}">
+<ds:datastoreItem xmlns:ds="http://schemas.openxmlformats.org/officeDocument/2006/customXml" ds:itemID="{0DBC4591-D6F0-4797-B1CB-1F0635331027}">
   <ds:schemaRefs>
-    <ds:schemaRef ds:uri="http://schemas.microsoft.com/office/2006/documentManagement/types"/>
-    <ds:schemaRef ds:uri="http://schemas.microsoft.com/office/2006/metadata/properties"/>
-    <ds:schemaRef ds:uri="http://purl.org/dc/dcmitype/"/>
-    <ds:schemaRef ds:uri="http://purl.org/dc/elements/1.1/"/>
-    <ds:schemaRef ds:uri="http://purl.org/dc/terms/"/>
-    <ds:schemaRef ds:uri="http://www.w3.org/XML/1998/namespace"/>
-    <ds:schemaRef ds:uri="http://schemas.microsoft.com/office/infopath/2007/PartnerControls"/>
-    <ds:schemaRef ds:uri="http://schemas.openxmlformats.org/package/2006/metadata/core-properties"/>
+    <ds:schemaRef ds:uri="http://schemas.microsoft.com/sharepoint/v3/contenttype/forms"/>
   </ds:schemaRefs>
 </ds:datastoreItem>
 </file>
</xml_diff>